<commit_message>
COMMIT FINAL, AÑADIENDO LINK A PRESENTACIÓN
</commit_message>
<xml_diff>
--- a/docs/Data_Mining_Proyecto1_Presentacion.pptx
+++ b/docs/Data_Mining_Proyecto1_Presentacion.pptx
@@ -22,6 +22,7 @@
     <p:sldId id="266" r:id="rId16"/>
     <p:sldId id="267" r:id="rId17"/>
     <p:sldId id="268" r:id="rId18"/>
+    <p:sldId id="274" r:id="rId19"/>
   </p:sldIdLst>
   <p:sldSz cx="12192000" cy="6858000"/>
   <p:notesSz cx="6858000" cy="9144000"/>
@@ -9196,6 +9197,153 @@
 </p:sld>
 </file>
 
+<file path=ppt/slides/slide18.xml><?xml version="1.0" encoding="utf-8"?>
+<p:sld xmlns:a="http://schemas.openxmlformats.org/drawingml/2006/main" xmlns:r="http://schemas.openxmlformats.org/officeDocument/2006/relationships" xmlns:p="http://schemas.openxmlformats.org/presentationml/2006/main">
+  <p:cSld>
+    <p:spTree>
+      <p:nvGrpSpPr>
+        <p:cNvPr id="1" name=""/>
+        <p:cNvGrpSpPr/>
+        <p:nvPr/>
+      </p:nvGrpSpPr>
+      <p:grpSpPr>
+        <a:xfrm>
+          <a:off x="0" y="0"/>
+          <a:ext cx="0" cy="0"/>
+          <a:chOff x="0" y="0"/>
+          <a:chExt cx="0" cy="0"/>
+        </a:xfrm>
+      </p:grpSpPr>
+      <p:sp>
+        <p:nvSpPr>
+          <p:cNvPr id="2" name="Título 1">
+            <a:extLst>
+              <a:ext uri="{FF2B5EF4-FFF2-40B4-BE49-F238E27FC236}">
+                <a16:creationId xmlns:a16="http://schemas.microsoft.com/office/drawing/2014/main" id="{BD03AD63-61CA-A47D-DE62-3CE247B8B72E}"/>
+              </a:ext>
+            </a:extLst>
+          </p:cNvPr>
+          <p:cNvSpPr>
+            <a:spLocks noGrp="1"/>
+          </p:cNvSpPr>
+          <p:nvPr>
+            <p:ph type="title"/>
+          </p:nvPr>
+        </p:nvSpPr>
+        <p:spPr/>
+        <p:txBody>
+          <a:bodyPr/>
+          <a:lstStyle/>
+          <a:p>
+            <a:r>
+              <a:rPr lang="es-EC" dirty="0"/>
+              <a:t>LINK DEL REPOSITORIO DE TODO EL ANÁLISIS</a:t>
+            </a:r>
+          </a:p>
+        </p:txBody>
+      </p:sp>
+      <p:sp>
+        <p:nvSpPr>
+          <p:cNvPr id="3" name="Marcador de contenido 2">
+            <a:extLst>
+              <a:ext uri="{FF2B5EF4-FFF2-40B4-BE49-F238E27FC236}">
+                <a16:creationId xmlns:a16="http://schemas.microsoft.com/office/drawing/2014/main" id="{D02F7767-28A4-5489-AA3C-4C51E486F342}"/>
+              </a:ext>
+            </a:extLst>
+          </p:cNvPr>
+          <p:cNvSpPr>
+            <a:spLocks noGrp="1"/>
+          </p:cNvSpPr>
+          <p:nvPr>
+            <p:ph idx="1"/>
+          </p:nvPr>
+        </p:nvSpPr>
+        <p:spPr>
+          <a:xfrm>
+            <a:off x="913795" y="2096064"/>
+            <a:ext cx="10353762" cy="676633"/>
+          </a:xfrm>
+        </p:spPr>
+        <p:txBody>
+          <a:bodyPr/>
+          <a:lstStyle/>
+          <a:p>
+            <a:r>
+              <a:rPr lang="es-EC" dirty="0">
+                <a:hlinkClick r:id="rId2">
+                  <a:extLst>
+                    <a:ext uri="{A12FA001-AC4F-418D-AE19-62706E023703}">
+                      <ahyp:hlinkClr xmlns:ahyp="http://schemas.microsoft.com/office/drawing/2018/hyperlinkcolor" val="tx"/>
+                    </a:ext>
+                  </a:extLst>
+                </a:hlinkClick>
+              </a:rPr>
+              <a:t>https://github.com/Ericson3100/Proyecto1DM</a:t>
+            </a:r>
+            <a:endParaRPr lang="es-EC" dirty="0"/>
+          </a:p>
+        </p:txBody>
+      </p:sp>
+      <p:pic>
+        <p:nvPicPr>
+          <p:cNvPr id="1026" name="Picture 2" descr="Qué es GitHub y por qué es útil en la actualidad 💻 | HACK A BOSS">
+            <a:extLst>
+              <a:ext uri="{FF2B5EF4-FFF2-40B4-BE49-F238E27FC236}">
+                <a16:creationId xmlns:a16="http://schemas.microsoft.com/office/drawing/2014/main" id="{A76B4447-A235-B466-7C4C-558DB3A99E83}"/>
+              </a:ext>
+            </a:extLst>
+          </p:cNvPr>
+          <p:cNvPicPr>
+            <a:picLocks noChangeAspect="1" noChangeArrowheads="1"/>
+          </p:cNvPicPr>
+          <p:nvPr/>
+        </p:nvPicPr>
+        <p:blipFill>
+          <a:blip r:embed="rId3">
+            <a:extLst>
+              <a:ext uri="{28A0092B-C50C-407E-A947-70E740481C1C}">
+                <a14:useLocalDpi xmlns:a14="http://schemas.microsoft.com/office/drawing/2010/main" val="0"/>
+              </a:ext>
+            </a:extLst>
+          </a:blip>
+          <a:srcRect/>
+          <a:stretch>
+            <a:fillRect/>
+          </a:stretch>
+        </p:blipFill>
+        <p:spPr bwMode="auto">
+          <a:xfrm>
+            <a:off x="5006957" y="2772697"/>
+            <a:ext cx="5198157" cy="3465438"/>
+          </a:xfrm>
+          <a:prstGeom prst="rect">
+            <a:avLst/>
+          </a:prstGeom>
+          <a:noFill/>
+          <a:extLst>
+            <a:ext uri="{909E8E84-426E-40DD-AFC4-6F175D3DCCD1}">
+              <a14:hiddenFill xmlns:a14="http://schemas.microsoft.com/office/drawing/2010/main">
+                <a:solidFill>
+                  <a:srgbClr val="FFFFFF"/>
+                </a:solidFill>
+              </a14:hiddenFill>
+            </a:ext>
+          </a:extLst>
+        </p:spPr>
+      </p:pic>
+    </p:spTree>
+    <p:extLst>
+      <p:ext uri="{BB962C8B-B14F-4D97-AF65-F5344CB8AC3E}">
+        <p14:creationId xmlns:p14="http://schemas.microsoft.com/office/powerpoint/2010/main" val="442611394"/>
+      </p:ext>
+    </p:extLst>
+  </p:cSld>
+  <p:clrMapOvr>
+    <a:masterClrMapping/>
+  </p:clrMapOvr>
+</p:sld>
+</file>
+
 <file path=ppt/slides/slide2.xml><?xml version="1.0" encoding="utf-8"?>
 <p:sld xmlns:a="http://schemas.openxmlformats.org/drawingml/2006/main" xmlns:r="http://schemas.openxmlformats.org/officeDocument/2006/relationships" xmlns:p="http://schemas.openxmlformats.org/presentationml/2006/main">
   <p:cSld>

</xml_diff>